<commit_message>
basic design. font not working yet
</commit_message>
<xml_diff>
--- a/src/assets/dice-images.pptx
+++ b/src/assets/dice-images.pptx
@@ -6,6 +6,7 @@
   </p:sldMasterIdLst>
   <p:sldIdLst>
     <p:sldId id="256" r:id="rId2"/>
+    <p:sldId id="257" r:id="rId3"/>
   </p:sldIdLst>
   <p:sldSz cx="12192000" cy="6858000"/>
   <p:notesSz cx="6858000" cy="9144000"/>
@@ -104,6 +105,11 @@
       </a:defRPr>
     </a:lvl9pPr>
   </p:defaultTextStyle>
+  <p:extLst>
+    <p:ext uri="{EFAFB233-063F-42B5-8137-9DF3F51BA10A}">
+      <p15:sldGuideLst xmlns:p15="http://schemas.microsoft.com/office/powerpoint/2012/main"/>
+    </p:ext>
+  </p:extLst>
 </p:presentation>
 </file>
 
@@ -254,7 +260,7 @@
           <a:p>
             <a:fld id="{51A8B352-4F93-48E8-A3DF-CE4259AFF93B}" type="datetimeFigureOut">
               <a:rPr lang="he-IL" smtClean="0"/>
-              <a:t>י"ב/טבת/תשפ"ב</a:t>
+              <a:t>י"ג/טבת/תשפ"ב</a:t>
             </a:fld>
             <a:endParaRPr lang="he-IL"/>
           </a:p>
@@ -452,7 +458,7 @@
           <a:p>
             <a:fld id="{51A8B352-4F93-48E8-A3DF-CE4259AFF93B}" type="datetimeFigureOut">
               <a:rPr lang="he-IL" smtClean="0"/>
-              <a:t>י"ב/טבת/תשפ"ב</a:t>
+              <a:t>י"ג/טבת/תשפ"ב</a:t>
             </a:fld>
             <a:endParaRPr lang="he-IL"/>
           </a:p>
@@ -660,7 +666,7 @@
           <a:p>
             <a:fld id="{51A8B352-4F93-48E8-A3DF-CE4259AFF93B}" type="datetimeFigureOut">
               <a:rPr lang="he-IL" smtClean="0"/>
-              <a:t>י"ב/טבת/תשפ"ב</a:t>
+              <a:t>י"ג/טבת/תשפ"ב</a:t>
             </a:fld>
             <a:endParaRPr lang="he-IL"/>
           </a:p>
@@ -858,7 +864,7 @@
           <a:p>
             <a:fld id="{51A8B352-4F93-48E8-A3DF-CE4259AFF93B}" type="datetimeFigureOut">
               <a:rPr lang="he-IL" smtClean="0"/>
-              <a:t>י"ב/טבת/תשפ"ב</a:t>
+              <a:t>י"ג/טבת/תשפ"ב</a:t>
             </a:fld>
             <a:endParaRPr lang="he-IL"/>
           </a:p>
@@ -1133,7 +1139,7 @@
           <a:p>
             <a:fld id="{51A8B352-4F93-48E8-A3DF-CE4259AFF93B}" type="datetimeFigureOut">
               <a:rPr lang="he-IL" smtClean="0"/>
-              <a:t>י"ב/טבת/תשפ"ב</a:t>
+              <a:t>י"ג/טבת/תשפ"ב</a:t>
             </a:fld>
             <a:endParaRPr lang="he-IL"/>
           </a:p>
@@ -1398,7 +1404,7 @@
           <a:p>
             <a:fld id="{51A8B352-4F93-48E8-A3DF-CE4259AFF93B}" type="datetimeFigureOut">
               <a:rPr lang="he-IL" smtClean="0"/>
-              <a:t>י"ב/טבת/תשפ"ב</a:t>
+              <a:t>י"ג/טבת/תשפ"ב</a:t>
             </a:fld>
             <a:endParaRPr lang="he-IL"/>
           </a:p>
@@ -1810,7 +1816,7 @@
           <a:p>
             <a:fld id="{51A8B352-4F93-48E8-A3DF-CE4259AFF93B}" type="datetimeFigureOut">
               <a:rPr lang="he-IL" smtClean="0"/>
-              <a:t>י"ב/טבת/תשפ"ב</a:t>
+              <a:t>י"ג/טבת/תשפ"ב</a:t>
             </a:fld>
             <a:endParaRPr lang="he-IL"/>
           </a:p>
@@ -1951,7 +1957,7 @@
           <a:p>
             <a:fld id="{51A8B352-4F93-48E8-A3DF-CE4259AFF93B}" type="datetimeFigureOut">
               <a:rPr lang="he-IL" smtClean="0"/>
-              <a:t>י"ב/טבת/תשפ"ב</a:t>
+              <a:t>י"ג/טבת/תשפ"ב</a:t>
             </a:fld>
             <a:endParaRPr lang="he-IL"/>
           </a:p>
@@ -2064,7 +2070,7 @@
           <a:p>
             <a:fld id="{51A8B352-4F93-48E8-A3DF-CE4259AFF93B}" type="datetimeFigureOut">
               <a:rPr lang="he-IL" smtClean="0"/>
-              <a:t>י"ב/טבת/תשפ"ב</a:t>
+              <a:t>י"ג/טבת/תשפ"ב</a:t>
             </a:fld>
             <a:endParaRPr lang="he-IL"/>
           </a:p>
@@ -2375,7 +2381,7 @@
           <a:p>
             <a:fld id="{51A8B352-4F93-48E8-A3DF-CE4259AFF93B}" type="datetimeFigureOut">
               <a:rPr lang="he-IL" smtClean="0"/>
-              <a:t>י"ב/טבת/תשפ"ב</a:t>
+              <a:t>י"ג/טבת/תשפ"ב</a:t>
             </a:fld>
             <a:endParaRPr lang="he-IL"/>
           </a:p>
@@ -2663,7 +2669,7 @@
           <a:p>
             <a:fld id="{51A8B352-4F93-48E8-A3DF-CE4259AFF93B}" type="datetimeFigureOut">
               <a:rPr lang="he-IL" smtClean="0"/>
-              <a:t>י"ב/טבת/תשפ"ב</a:t>
+              <a:t>י"ג/טבת/תשפ"ב</a:t>
             </a:fld>
             <a:endParaRPr lang="he-IL"/>
           </a:p>
@@ -2904,7 +2910,7 @@
           <a:p>
             <a:fld id="{51A8B352-4F93-48E8-A3DF-CE4259AFF93B}" type="datetimeFigureOut">
               <a:rPr lang="he-IL" smtClean="0"/>
-              <a:t>י"ב/טבת/תשפ"ב</a:t>
+              <a:t>י"ג/טבת/תשפ"ב</a:t>
             </a:fld>
             <a:endParaRPr lang="he-IL"/>
           </a:p>
@@ -3321,261 +3327,6 @@
           <a:chExt cx="0" cy="0"/>
         </a:xfrm>
       </p:grpSpPr>
-      <p:pic>
-        <p:nvPicPr>
-          <p:cNvPr id="14" name="תמונה 13">
-            <a:extLst>
-              <a:ext uri="{FF2B5EF4-FFF2-40B4-BE49-F238E27FC236}">
-                <a16:creationId xmlns:a16="http://schemas.microsoft.com/office/drawing/2014/main" id="{D24DBA29-5A86-4F5E-9B1D-C2AD3DC196F4}"/>
-              </a:ext>
-            </a:extLst>
-          </p:cNvPr>
-          <p:cNvPicPr>
-            <a:picLocks noChangeAspect="1"/>
-          </p:cNvPicPr>
-          <p:nvPr/>
-        </p:nvPicPr>
-        <p:blipFill>
-          <a:blip r:embed="rId2">
-            <a:extLst>
-              <a:ext uri="{28A0092B-C50C-407E-A947-70E740481C1C}">
-                <a14:useLocalDpi xmlns:a14="http://schemas.microsoft.com/office/drawing/2010/main" val="0"/>
-              </a:ext>
-            </a:extLst>
-          </a:blip>
-          <a:stretch>
-            <a:fillRect/>
-          </a:stretch>
-        </p:blipFill>
-        <p:spPr>
-          <a:xfrm>
-            <a:off x="1856795" y="-3271110"/>
-            <a:ext cx="2857500" cy="2857500"/>
-          </a:xfrm>
-          <a:prstGeom prst="rect">
-            <a:avLst/>
-          </a:prstGeom>
-        </p:spPr>
-      </p:pic>
-      <p:pic>
-        <p:nvPicPr>
-          <p:cNvPr id="16" name="תמונה 15">
-            <a:extLst>
-              <a:ext uri="{FF2B5EF4-FFF2-40B4-BE49-F238E27FC236}">
-                <a16:creationId xmlns:a16="http://schemas.microsoft.com/office/drawing/2014/main" id="{1F009580-2185-4A19-A339-F64A0BEF7B1C}"/>
-              </a:ext>
-            </a:extLst>
-          </p:cNvPr>
-          <p:cNvPicPr>
-            <a:picLocks noChangeAspect="1"/>
-          </p:cNvPicPr>
-          <p:nvPr/>
-        </p:nvPicPr>
-        <p:blipFill>
-          <a:blip r:embed="rId3">
-            <a:extLst>
-              <a:ext uri="{28A0092B-C50C-407E-A947-70E740481C1C}">
-                <a14:useLocalDpi xmlns:a14="http://schemas.microsoft.com/office/drawing/2010/main" val="0"/>
-              </a:ext>
-            </a:extLst>
-          </a:blip>
-          <a:stretch>
-            <a:fillRect/>
-          </a:stretch>
-        </p:blipFill>
-        <p:spPr>
-          <a:xfrm>
-            <a:off x="4342696" y="6877050"/>
-            <a:ext cx="2857500" cy="2857500"/>
-          </a:xfrm>
-          <a:prstGeom prst="rect">
-            <a:avLst/>
-          </a:prstGeom>
-        </p:spPr>
-      </p:pic>
-      <p:pic>
-        <p:nvPicPr>
-          <p:cNvPr id="18" name="תמונה 17">
-            <a:extLst>
-              <a:ext uri="{FF2B5EF4-FFF2-40B4-BE49-F238E27FC236}">
-                <a16:creationId xmlns:a16="http://schemas.microsoft.com/office/drawing/2014/main" id="{B12F9A8A-A863-43DC-846E-F6C1D5F535B4}"/>
-              </a:ext>
-            </a:extLst>
-          </p:cNvPr>
-          <p:cNvPicPr>
-            <a:picLocks noChangeAspect="1"/>
-          </p:cNvPicPr>
-          <p:nvPr/>
-        </p:nvPicPr>
-        <p:blipFill>
-          <a:blip r:embed="rId4">
-            <a:extLst>
-              <a:ext uri="{28A0092B-C50C-407E-A947-70E740481C1C}">
-                <a14:useLocalDpi xmlns:a14="http://schemas.microsoft.com/office/drawing/2010/main" val="0"/>
-              </a:ext>
-            </a:extLst>
-          </a:blip>
-          <a:stretch>
-            <a:fillRect/>
-          </a:stretch>
-        </p:blipFill>
-        <p:spPr>
-          <a:xfrm>
-            <a:off x="7477705" y="6648450"/>
-            <a:ext cx="2857500" cy="2857500"/>
-          </a:xfrm>
-          <a:prstGeom prst="rect">
-            <a:avLst/>
-          </a:prstGeom>
-        </p:spPr>
-      </p:pic>
-      <p:pic>
-        <p:nvPicPr>
-          <p:cNvPr id="20" name="תמונה 19" descr="תמונה שמכילה טקסט, גרפיקה וקטורית, חדר&#10;&#10;התיאור נוצר באופן אוטומטי">
-            <a:extLst>
-              <a:ext uri="{FF2B5EF4-FFF2-40B4-BE49-F238E27FC236}">
-                <a16:creationId xmlns:a16="http://schemas.microsoft.com/office/drawing/2014/main" id="{700B01D9-8315-4719-82F1-316CA8088710}"/>
-              </a:ext>
-            </a:extLst>
-          </p:cNvPr>
-          <p:cNvPicPr>
-            <a:picLocks noChangeAspect="1"/>
-          </p:cNvPicPr>
-          <p:nvPr/>
-        </p:nvPicPr>
-        <p:blipFill>
-          <a:blip r:embed="rId5">
-            <a:extLst>
-              <a:ext uri="{28A0092B-C50C-407E-A947-70E740481C1C}">
-                <a14:useLocalDpi xmlns:a14="http://schemas.microsoft.com/office/drawing/2010/main" val="0"/>
-              </a:ext>
-            </a:extLst>
-          </a:blip>
-          <a:stretch>
-            <a:fillRect/>
-          </a:stretch>
-        </p:blipFill>
-        <p:spPr>
-          <a:xfrm>
-            <a:off x="12192000" y="5697005"/>
-            <a:ext cx="2857500" cy="2857500"/>
-          </a:xfrm>
-          <a:prstGeom prst="rect">
-            <a:avLst/>
-          </a:prstGeom>
-        </p:spPr>
-      </p:pic>
-      <p:pic>
-        <p:nvPicPr>
-          <p:cNvPr id="22" name="תמונה 21">
-            <a:extLst>
-              <a:ext uri="{FF2B5EF4-FFF2-40B4-BE49-F238E27FC236}">
-                <a16:creationId xmlns:a16="http://schemas.microsoft.com/office/drawing/2014/main" id="{DBCF3283-9A31-45E4-A5AB-2134E9D049CB}"/>
-              </a:ext>
-            </a:extLst>
-          </p:cNvPr>
-          <p:cNvPicPr>
-            <a:picLocks noChangeAspect="1"/>
-          </p:cNvPicPr>
-          <p:nvPr/>
-        </p:nvPicPr>
-        <p:blipFill>
-          <a:blip r:embed="rId6">
-            <a:alphaModFix/>
-            <a:biLevel thresh="75000"/>
-            <a:extLst>
-              <a:ext uri="{28A0092B-C50C-407E-A947-70E740481C1C}">
-                <a14:useLocalDpi xmlns:a14="http://schemas.microsoft.com/office/drawing/2010/main" val="0"/>
-              </a:ext>
-            </a:extLst>
-          </a:blip>
-          <a:stretch>
-            <a:fillRect/>
-          </a:stretch>
-        </p:blipFill>
-        <p:spPr>
-          <a:xfrm>
-            <a:off x="661442" y="7125755"/>
-            <a:ext cx="2857500" cy="2857500"/>
-          </a:xfrm>
-          <a:prstGeom prst="roundRect">
-            <a:avLst>
-              <a:gd name="adj" fmla="val 9616"/>
-            </a:avLst>
-          </a:prstGeom>
-          <a:effectLst>
-            <a:softEdge rad="0"/>
-          </a:effectLst>
-          <a:scene3d>
-            <a:camera prst="orthographicFront"/>
-            <a:lightRig rig="threePt" dir="t"/>
-          </a:scene3d>
-          <a:sp3d>
-            <a:bevelT w="254000" h="254000" prst="angle"/>
-          </a:sp3d>
-        </p:spPr>
-      </p:pic>
-      <p:pic>
-        <p:nvPicPr>
-          <p:cNvPr id="24" name="תמונה 23">
-            <a:extLst>
-              <a:ext uri="{FF2B5EF4-FFF2-40B4-BE49-F238E27FC236}">
-                <a16:creationId xmlns:a16="http://schemas.microsoft.com/office/drawing/2014/main" id="{C966EC44-C601-4FBC-8A7B-9FD85407A86F}"/>
-              </a:ext>
-            </a:extLst>
-          </p:cNvPr>
-          <p:cNvPicPr>
-            <a:picLocks noChangeAspect="1"/>
-          </p:cNvPicPr>
-          <p:nvPr/>
-        </p:nvPicPr>
-        <p:blipFill>
-          <a:blip r:embed="rId7">
-            <a:alphaModFix/>
-            <a:extLst>
-              <a:ext uri="{BEBA8EAE-BF5A-486C-A8C5-ECC9F3942E4B}">
-                <a14:imgProps xmlns:a14="http://schemas.microsoft.com/office/drawing/2010/main">
-                  <a14:imgLayer r:embed="rId8">
-                    <a14:imgEffect>
-                      <a14:colorTemperature colorTemp="2776"/>
-                    </a14:imgEffect>
-                    <a14:imgEffect>
-                      <a14:saturation sat="400000"/>
-                    </a14:imgEffect>
-                  </a14:imgLayer>
-                </a14:imgProps>
-              </a:ext>
-              <a:ext uri="{28A0092B-C50C-407E-A947-70E740481C1C}">
-                <a14:useLocalDpi xmlns:a14="http://schemas.microsoft.com/office/drawing/2010/main" val="0"/>
-              </a:ext>
-            </a:extLst>
-          </a:blip>
-          <a:stretch>
-            <a:fillRect/>
-          </a:stretch>
-        </p:blipFill>
-        <p:spPr>
-          <a:xfrm>
-            <a:off x="-3019812" y="5960960"/>
-            <a:ext cx="2857500" cy="2857500"/>
-          </a:xfrm>
-          <a:prstGeom prst="roundRect">
-            <a:avLst>
-              <a:gd name="adj" fmla="val 9616"/>
-            </a:avLst>
-          </a:prstGeom>
-          <a:effectLst>
-            <a:softEdge rad="0"/>
-          </a:effectLst>
-          <a:scene3d>
-            <a:camera prst="orthographicFront"/>
-            <a:lightRig rig="threePt" dir="t"/>
-          </a:scene3d>
-          <a:sp3d>
-            <a:bevelT w="254000" h="254000" prst="angle"/>
-          </a:sp3d>
-        </p:spPr>
-      </p:pic>
       <p:sp>
         <p:nvSpPr>
           <p:cNvPr id="26" name="מלבן: פינות מעוגלות 25">
@@ -5293,6 +5044,241 @@
     <p:extLst>
       <p:ext uri="{BB962C8B-B14F-4D97-AF65-F5344CB8AC3E}">
         <p14:creationId xmlns:p14="http://schemas.microsoft.com/office/powerpoint/2010/main" val="1966078739"/>
+      </p:ext>
+    </p:extLst>
+  </p:cSld>
+  <p:clrMapOvr>
+    <a:masterClrMapping/>
+  </p:clrMapOvr>
+</p:sld>
+</file>
+
+<file path=ppt/slides/slide2.xml><?xml version="1.0" encoding="utf-8"?>
+<p:sld xmlns:a="http://schemas.openxmlformats.org/drawingml/2006/main" xmlns:r="http://schemas.openxmlformats.org/officeDocument/2006/relationships" xmlns:p="http://schemas.openxmlformats.org/presentationml/2006/main">
+  <p:cSld>
+    <p:spTree>
+      <p:nvGrpSpPr>
+        <p:cNvPr id="1" name=""/>
+        <p:cNvGrpSpPr/>
+        <p:nvPr/>
+      </p:nvGrpSpPr>
+      <p:grpSpPr>
+        <a:xfrm>
+          <a:off x="0" y="0"/>
+          <a:ext cx="0" cy="0"/>
+          <a:chOff x="0" y="0"/>
+          <a:chExt cx="0" cy="0"/>
+        </a:xfrm>
+      </p:grpSpPr>
+      <p:sp>
+        <p:nvSpPr>
+          <p:cNvPr id="26" name="מלבן: פינות מעוגלות 25">
+            <a:extLst>
+              <a:ext uri="{FF2B5EF4-FFF2-40B4-BE49-F238E27FC236}">
+                <a16:creationId xmlns:a16="http://schemas.microsoft.com/office/drawing/2014/main" id="{903D7FFA-6386-4F42-B051-9A3B14D11E1F}"/>
+              </a:ext>
+            </a:extLst>
+          </p:cNvPr>
+          <p:cNvSpPr/>
+          <p:nvPr/>
+        </p:nvSpPr>
+        <p:spPr>
+          <a:xfrm>
+            <a:off x="3475033" y="1306972"/>
+            <a:ext cx="2857500" cy="2857500"/>
+          </a:xfrm>
+          <a:prstGeom prst="roundRect">
+            <a:avLst>
+              <a:gd name="adj" fmla="val 10701"/>
+            </a:avLst>
+          </a:prstGeom>
+          <a:gradFill flip="none" rotWithShape="1">
+            <a:gsLst>
+              <a:gs pos="0">
+                <a:srgbClr val="FFC5FF">
+                  <a:alpha val="20000"/>
+                </a:srgbClr>
+              </a:gs>
+              <a:gs pos="83000">
+                <a:schemeClr val="accent1">
+                  <a:lumMod val="45000"/>
+                  <a:lumOff val="55000"/>
+                  <a:alpha val="20000"/>
+                </a:schemeClr>
+              </a:gs>
+              <a:gs pos="100000">
+                <a:schemeClr val="accent1">
+                  <a:lumMod val="30000"/>
+                  <a:lumOff val="70000"/>
+                  <a:alpha val="20000"/>
+                </a:schemeClr>
+              </a:gs>
+            </a:gsLst>
+            <a:lin ang="2700000" scaled="1"/>
+            <a:tileRect/>
+          </a:gradFill>
+          <a:ln>
+            <a:noFill/>
+          </a:ln>
+          <a:scene3d>
+            <a:camera prst="orthographicFront"/>
+            <a:lightRig rig="threePt" dir="t"/>
+          </a:scene3d>
+          <a:sp3d>
+            <a:bevelT w="381000" h="381000"/>
+          </a:sp3d>
+        </p:spPr>
+        <p:style>
+          <a:lnRef idx="2">
+            <a:schemeClr val="accent1">
+              <a:shade val="50000"/>
+            </a:schemeClr>
+          </a:lnRef>
+          <a:fillRef idx="1">
+            <a:schemeClr val="accent1"/>
+          </a:fillRef>
+          <a:effectRef idx="0">
+            <a:schemeClr val="accent1"/>
+          </a:effectRef>
+          <a:fontRef idx="minor">
+            <a:schemeClr val="lt1"/>
+          </a:fontRef>
+        </p:style>
+        <p:txBody>
+          <a:bodyPr rtlCol="1" anchor="ctr"/>
+          <a:lstStyle/>
+          <a:p>
+            <a:pPr algn="ctr"/>
+            <a:endParaRPr lang="he-IL"/>
+          </a:p>
+        </p:txBody>
+      </p:sp>
+      <p:sp>
+        <p:nvSpPr>
+          <p:cNvPr id="27" name="אליפסה 26">
+            <a:extLst>
+              <a:ext uri="{FF2B5EF4-FFF2-40B4-BE49-F238E27FC236}">
+                <a16:creationId xmlns:a16="http://schemas.microsoft.com/office/drawing/2014/main" id="{F918ED88-A1CD-421D-89F2-2873E2353CFE}"/>
+              </a:ext>
+            </a:extLst>
+          </p:cNvPr>
+          <p:cNvSpPr/>
+          <p:nvPr/>
+        </p:nvSpPr>
+        <p:spPr>
+          <a:xfrm>
+            <a:off x="8219991" y="4164472"/>
+            <a:ext cx="466795" cy="450000"/>
+          </a:xfrm>
+          <a:prstGeom prst="ellipse">
+            <a:avLst/>
+          </a:prstGeom>
+          <a:solidFill>
+            <a:schemeClr val="tx1">
+              <a:alpha val="20000"/>
+            </a:schemeClr>
+          </a:solidFill>
+          <a:ln>
+            <a:noFill/>
+          </a:ln>
+          <a:scene3d>
+            <a:camera prst="orthographicFront"/>
+            <a:lightRig rig="threePt" dir="t"/>
+          </a:scene3d>
+          <a:sp3d>
+            <a:bevelT w="152400" h="50800" prst="softRound"/>
+          </a:sp3d>
+        </p:spPr>
+        <p:style>
+          <a:lnRef idx="2">
+            <a:schemeClr val="accent1">
+              <a:shade val="50000"/>
+            </a:schemeClr>
+          </a:lnRef>
+          <a:fillRef idx="1">
+            <a:schemeClr val="accent1"/>
+          </a:fillRef>
+          <a:effectRef idx="0">
+            <a:schemeClr val="accent1"/>
+          </a:effectRef>
+          <a:fontRef idx="minor">
+            <a:schemeClr val="lt1"/>
+          </a:fontRef>
+        </p:style>
+        <p:txBody>
+          <a:bodyPr rtlCol="1" anchor="ctr"/>
+          <a:lstStyle/>
+          <a:p>
+            <a:pPr algn="ctr"/>
+            <a:endParaRPr lang="he-IL"/>
+          </a:p>
+        </p:txBody>
+      </p:sp>
+      <p:sp>
+        <p:nvSpPr>
+          <p:cNvPr id="28" name="אליפסה 27">
+            <a:extLst>
+              <a:ext uri="{FF2B5EF4-FFF2-40B4-BE49-F238E27FC236}">
+                <a16:creationId xmlns:a16="http://schemas.microsoft.com/office/drawing/2014/main" id="{9F10365D-04F2-4881-B858-66A1E3A0246D}"/>
+              </a:ext>
+            </a:extLst>
+          </p:cNvPr>
+          <p:cNvSpPr/>
+          <p:nvPr/>
+        </p:nvSpPr>
+        <p:spPr>
+          <a:xfrm>
+            <a:off x="8370033" y="2269245"/>
+            <a:ext cx="466795" cy="450000"/>
+          </a:xfrm>
+          <a:prstGeom prst="ellipse">
+            <a:avLst/>
+          </a:prstGeom>
+          <a:solidFill>
+            <a:schemeClr val="tx1">
+              <a:alpha val="20000"/>
+            </a:schemeClr>
+          </a:solidFill>
+          <a:ln>
+            <a:noFill/>
+          </a:ln>
+          <a:scene3d>
+            <a:camera prst="orthographicFront"/>
+            <a:lightRig rig="threePt" dir="t"/>
+          </a:scene3d>
+          <a:sp3d>
+            <a:bevelT w="152400" h="50800" prst="softRound"/>
+          </a:sp3d>
+        </p:spPr>
+        <p:style>
+          <a:lnRef idx="2">
+            <a:schemeClr val="accent1">
+              <a:shade val="50000"/>
+            </a:schemeClr>
+          </a:lnRef>
+          <a:fillRef idx="1">
+            <a:schemeClr val="accent1"/>
+          </a:fillRef>
+          <a:effectRef idx="0">
+            <a:schemeClr val="accent1"/>
+          </a:effectRef>
+          <a:fontRef idx="minor">
+            <a:schemeClr val="lt1"/>
+          </a:fontRef>
+        </p:style>
+        <p:txBody>
+          <a:bodyPr rtlCol="1" anchor="ctr"/>
+          <a:lstStyle/>
+          <a:p>
+            <a:pPr algn="ctr"/>
+            <a:endParaRPr lang="he-IL"/>
+          </a:p>
+        </p:txBody>
+      </p:sp>
+    </p:spTree>
+    <p:extLst>
+      <p:ext uri="{BB962C8B-B14F-4D97-AF65-F5344CB8AC3E}">
+        <p14:creationId xmlns:p14="http://schemas.microsoft.com/office/powerpoint/2010/main" val="204247139"/>
       </p:ext>
     </p:extLst>
   </p:cSld>

</xml_diff>